<commit_message>
Added win scene, updated presentation
</commit_message>
<xml_diff>
--- a/Sinister Transistor.pptx
+++ b/Sinister Transistor.pptx
@@ -1,6 +1,6 @@
 
 <file path=ppt/presentation.xml><?xml version="1.0" encoding="utf-8"?>
-<p:presentation xmlns:a="http://schemas.openxmlformats.org/drawingml/2006/main" xmlns:r="http://schemas.openxmlformats.org/officeDocument/2006/relationships" xmlns:p="http://schemas.openxmlformats.org/presentationml/2006/main" autoCompressPictures="0">
+<p:presentation xmlns:a="http://schemas.openxmlformats.org/drawingml/2006/main" xmlns:r="http://schemas.openxmlformats.org/officeDocument/2006/relationships" xmlns:p="http://schemas.openxmlformats.org/presentationml/2006/main" saveSubsetFonts="1" autoCompressPictures="0">
   <p:sldMasterIdLst>
     <p:sldMasterId id="2147483648" r:id="rId1"/>
   </p:sldMasterIdLst>
@@ -9,6 +9,16 @@
     <p:sldId id="257" r:id="rId3"/>
     <p:sldId id="258" r:id="rId4"/>
     <p:sldId id="259" r:id="rId5"/>
+    <p:sldId id="260" r:id="rId6"/>
+    <p:sldId id="261" r:id="rId7"/>
+    <p:sldId id="262" r:id="rId8"/>
+    <p:sldId id="263" r:id="rId9"/>
+    <p:sldId id="264" r:id="rId10"/>
+    <p:sldId id="265" r:id="rId11"/>
+    <p:sldId id="266" r:id="rId12"/>
+    <p:sldId id="267" r:id="rId13"/>
+    <p:sldId id="268" r:id="rId14"/>
+    <p:sldId id="269" r:id="rId15"/>
   </p:sldIdLst>
   <p:sldSz cx="12192000" cy="6858000"/>
   <p:notesSz cx="6858000" cy="9144000"/>
@@ -107,6 +117,11 @@
       </a:defRPr>
     </a:lvl9pPr>
   </p:defaultTextStyle>
+  <p:extLst>
+    <p:ext uri="{EFAFB233-063F-42B5-8137-9DF3F51BA10A}">
+      <p15:sldGuideLst xmlns:p15="http://schemas.microsoft.com/office/powerpoint/2012/main"/>
+    </p:ext>
+  </p:extLst>
 </p:presentation>
 </file>
 
@@ -160,7 +175,7 @@
           <a:noFill/>
           <a:extLst>
             <a:ext uri="{909E8E84-426E-40dd-AFC4-6F175D3DCCD1}">
-              <a14:hiddenFill xmlns:a14="http://schemas.microsoft.com/office/drawing/2010/main" xmlns="">
+              <a14:hiddenFill xmlns="" xmlns:a14="http://schemas.microsoft.com/office/drawing/2010/main">
                 <a:solidFill>
                   <a:srgbClr val="FFFFFF"/>
                 </a:solidFill>
@@ -220,7 +235,7 @@
             </a:ln>
             <a:extLst>
               <a:ext uri="{91240B29-F687-4f45-9708-019B960494DF}">
-                <a14:hiddenLine xmlns:a14="http://schemas.microsoft.com/office/drawing/2010/main" xmlns="" w="9525">
+                <a14:hiddenLine xmlns="" xmlns:a14="http://schemas.microsoft.com/office/drawing/2010/main" w="9525">
                   <a:solidFill>
                     <a:srgbClr val="000000"/>
                   </a:solidFill>
@@ -310,7 +325,7 @@
             </a:ln>
             <a:extLst>
               <a:ext uri="{91240B29-F687-4f45-9708-019B960494DF}">
-                <a14:hiddenLine xmlns:a14="http://schemas.microsoft.com/office/drawing/2010/main" xmlns="" w="9525">
+                <a14:hiddenLine xmlns="" xmlns:a14="http://schemas.microsoft.com/office/drawing/2010/main" w="9525">
                   <a:solidFill>
                     <a:srgbClr val="000000"/>
                   </a:solidFill>
@@ -400,7 +415,7 @@
             </a:ln>
             <a:extLst>
               <a:ext uri="{91240B29-F687-4f45-9708-019B960494DF}">
-                <a14:hiddenLine xmlns:a14="http://schemas.microsoft.com/office/drawing/2010/main" xmlns="" w="9525">
+                <a14:hiddenLine xmlns="" xmlns:a14="http://schemas.microsoft.com/office/drawing/2010/main" w="9525">
                   <a:solidFill>
                     <a:srgbClr val="000000"/>
                   </a:solidFill>
@@ -434,7 +449,7 @@
             </a:ln>
             <a:extLst>
               <a:ext uri="{91240B29-F687-4f45-9708-019B960494DF}">
-                <a14:hiddenLine xmlns:a14="http://schemas.microsoft.com/office/drawing/2010/main" xmlns="" w="9525">
+                <a14:hiddenLine xmlns="" xmlns:a14="http://schemas.microsoft.com/office/drawing/2010/main" w="9525">
                   <a:solidFill>
                     <a:srgbClr val="000000"/>
                   </a:solidFill>
@@ -524,7 +539,7 @@
             </a:ln>
             <a:extLst>
               <a:ext uri="{91240B29-F687-4f45-9708-019B960494DF}">
-                <a14:hiddenLine xmlns:a14="http://schemas.microsoft.com/office/drawing/2010/main" xmlns="" w="9525">
+                <a14:hiddenLine xmlns="" xmlns:a14="http://schemas.microsoft.com/office/drawing/2010/main" w="9525">
                   <a:solidFill>
                     <a:srgbClr val="000000"/>
                   </a:solidFill>
@@ -586,7 +601,7 @@
             </a:ln>
             <a:extLst>
               <a:ext uri="{91240B29-F687-4f45-9708-019B960494DF}">
-                <a14:hiddenLine xmlns:a14="http://schemas.microsoft.com/office/drawing/2010/main" xmlns="" w="9525">
+                <a14:hiddenLine xmlns="" xmlns:a14="http://schemas.microsoft.com/office/drawing/2010/main" w="9525">
                   <a:solidFill>
                     <a:srgbClr val="000000"/>
                   </a:solidFill>
@@ -648,7 +663,7 @@
             </a:ln>
             <a:extLst>
               <a:ext uri="{91240B29-F687-4f45-9708-019B960494DF}">
-                <a14:hiddenLine xmlns:a14="http://schemas.microsoft.com/office/drawing/2010/main" xmlns="" w="9525">
+                <a14:hiddenLine xmlns="" xmlns:a14="http://schemas.microsoft.com/office/drawing/2010/main" w="9525">
                   <a:solidFill>
                     <a:srgbClr val="000000"/>
                   </a:solidFill>
@@ -738,7 +753,7 @@
             </a:ln>
             <a:extLst>
               <a:ext uri="{91240B29-F687-4f45-9708-019B960494DF}">
-                <a14:hiddenLine xmlns:a14="http://schemas.microsoft.com/office/drawing/2010/main" xmlns="" w="9525">
+                <a14:hiddenLine xmlns="" xmlns:a14="http://schemas.microsoft.com/office/drawing/2010/main" w="9525">
                   <a:solidFill>
                     <a:srgbClr val="000000"/>
                   </a:solidFill>
@@ -800,7 +815,7 @@
             </a:ln>
             <a:extLst>
               <a:ext uri="{91240B29-F687-4f45-9708-019B960494DF}">
-                <a14:hiddenLine xmlns:a14="http://schemas.microsoft.com/office/drawing/2010/main" xmlns="" w="9525">
+                <a14:hiddenLine xmlns="" xmlns:a14="http://schemas.microsoft.com/office/drawing/2010/main" w="9525">
                   <a:solidFill>
                     <a:srgbClr val="000000"/>
                   </a:solidFill>
@@ -862,7 +877,7 @@
             </a:ln>
             <a:extLst>
               <a:ext uri="{91240B29-F687-4f45-9708-019B960494DF}">
-                <a14:hiddenLine xmlns:a14="http://schemas.microsoft.com/office/drawing/2010/main" xmlns="" w="9525">
+                <a14:hiddenLine xmlns="" xmlns:a14="http://schemas.microsoft.com/office/drawing/2010/main" w="9525">
                   <a:solidFill>
                     <a:srgbClr val="000000"/>
                   </a:solidFill>
@@ -952,7 +967,7 @@
             </a:ln>
             <a:extLst>
               <a:ext uri="{91240B29-F687-4f45-9708-019B960494DF}">
-                <a14:hiddenLine xmlns:a14="http://schemas.microsoft.com/office/drawing/2010/main" xmlns="" w="9525">
+                <a14:hiddenLine xmlns="" xmlns:a14="http://schemas.microsoft.com/office/drawing/2010/main" w="9525">
                   <a:solidFill>
                     <a:srgbClr val="000000"/>
                   </a:solidFill>
@@ -1042,7 +1057,7 @@
             </a:ln>
             <a:extLst>
               <a:ext uri="{91240B29-F687-4f45-9708-019B960494DF}">
-                <a14:hiddenLine xmlns:a14="http://schemas.microsoft.com/office/drawing/2010/main" xmlns="" w="9525">
+                <a14:hiddenLine xmlns="" xmlns:a14="http://schemas.microsoft.com/office/drawing/2010/main" w="9525">
                   <a:solidFill>
                     <a:srgbClr val="000000"/>
                   </a:solidFill>
@@ -1104,7 +1119,7 @@
             </a:ln>
             <a:extLst>
               <a:ext uri="{91240B29-F687-4f45-9708-019B960494DF}">
-                <a14:hiddenLine xmlns:a14="http://schemas.microsoft.com/office/drawing/2010/main" xmlns="" w="9525">
+                <a14:hiddenLine xmlns="" xmlns:a14="http://schemas.microsoft.com/office/drawing/2010/main" w="9525">
                   <a:solidFill>
                     <a:srgbClr val="000000"/>
                   </a:solidFill>
@@ -1214,7 +1229,7 @@
             </a:ln>
             <a:extLst>
               <a:ext uri="{91240B29-F687-4f45-9708-019B960494DF}">
-                <a14:hiddenLine xmlns:a14="http://schemas.microsoft.com/office/drawing/2010/main" xmlns="" w="9525">
+                <a14:hiddenLine xmlns="" xmlns:a14="http://schemas.microsoft.com/office/drawing/2010/main" w="9525">
                   <a:solidFill>
                     <a:srgbClr val="000000"/>
                   </a:solidFill>
@@ -1276,7 +1291,7 @@
             </a:ln>
             <a:extLst>
               <a:ext uri="{91240B29-F687-4f45-9708-019B960494DF}">
-                <a14:hiddenLine xmlns:a14="http://schemas.microsoft.com/office/drawing/2010/main" xmlns="" w="9525">
+                <a14:hiddenLine xmlns="" xmlns:a14="http://schemas.microsoft.com/office/drawing/2010/main" w="9525">
                   <a:solidFill>
                     <a:srgbClr val="000000"/>
                   </a:solidFill>
@@ -1366,7 +1381,7 @@
             </a:ln>
             <a:extLst>
               <a:ext uri="{91240B29-F687-4f45-9708-019B960494DF}">
-                <a14:hiddenLine xmlns:a14="http://schemas.microsoft.com/office/drawing/2010/main" xmlns="" w="9525">
+                <a14:hiddenLine xmlns="" xmlns:a14="http://schemas.microsoft.com/office/drawing/2010/main" w="9525">
                   <a:solidFill>
                     <a:srgbClr val="000000"/>
                   </a:solidFill>
@@ -1456,7 +1471,7 @@
             </a:ln>
             <a:extLst>
               <a:ext uri="{91240B29-F687-4f45-9708-019B960494DF}">
-                <a14:hiddenLine xmlns:a14="http://schemas.microsoft.com/office/drawing/2010/main" xmlns="" w="9525">
+                <a14:hiddenLine xmlns="" xmlns:a14="http://schemas.microsoft.com/office/drawing/2010/main" w="9525">
                   <a:solidFill>
                     <a:srgbClr val="000000"/>
                   </a:solidFill>
@@ -1518,7 +1533,7 @@
             </a:ln>
             <a:extLst>
               <a:ext uri="{91240B29-F687-4f45-9708-019B960494DF}">
-                <a14:hiddenLine xmlns:a14="http://schemas.microsoft.com/office/drawing/2010/main" xmlns="" w="9525">
+                <a14:hiddenLine xmlns="" xmlns:a14="http://schemas.microsoft.com/office/drawing/2010/main" w="9525">
                   <a:solidFill>
                     <a:srgbClr val="000000"/>
                   </a:solidFill>
@@ -1608,7 +1623,7 @@
             </a:ln>
             <a:extLst>
               <a:ext uri="{91240B29-F687-4f45-9708-019B960494DF}">
-                <a14:hiddenLine xmlns:a14="http://schemas.microsoft.com/office/drawing/2010/main" xmlns="" w="9525">
+                <a14:hiddenLine xmlns="" xmlns:a14="http://schemas.microsoft.com/office/drawing/2010/main" w="9525">
                   <a:solidFill>
                     <a:srgbClr val="000000"/>
                   </a:solidFill>
@@ -1698,7 +1713,7 @@
             </a:ln>
             <a:extLst>
               <a:ext uri="{91240B29-F687-4f45-9708-019B960494DF}">
-                <a14:hiddenLine xmlns:a14="http://schemas.microsoft.com/office/drawing/2010/main" xmlns="" w="9525">
+                <a14:hiddenLine xmlns="" xmlns:a14="http://schemas.microsoft.com/office/drawing/2010/main" w="9525">
                   <a:solidFill>
                     <a:srgbClr val="000000"/>
                   </a:solidFill>
@@ -1754,7 +1769,7 @@
             </a:ln>
             <a:extLst>
               <a:ext uri="{91240B29-F687-4f45-9708-019B960494DF}">
-                <a14:hiddenLine xmlns:a14="http://schemas.microsoft.com/office/drawing/2010/main" xmlns="" w="9525">
+                <a14:hiddenLine xmlns="" xmlns:a14="http://schemas.microsoft.com/office/drawing/2010/main" w="9525">
                   <a:solidFill>
                     <a:srgbClr val="000000"/>
                   </a:solidFill>
@@ -1844,7 +1859,7 @@
             </a:ln>
             <a:extLst>
               <a:ext uri="{91240B29-F687-4f45-9708-019B960494DF}">
-                <a14:hiddenLine xmlns:a14="http://schemas.microsoft.com/office/drawing/2010/main" xmlns="" w="9525">
+                <a14:hiddenLine xmlns="" xmlns:a14="http://schemas.microsoft.com/office/drawing/2010/main" w="9525">
                   <a:solidFill>
                     <a:srgbClr val="000000"/>
                   </a:solidFill>
@@ -1900,7 +1915,7 @@
             </a:ln>
             <a:extLst>
               <a:ext uri="{91240B29-F687-4f45-9708-019B960494DF}">
-                <a14:hiddenLine xmlns:a14="http://schemas.microsoft.com/office/drawing/2010/main" xmlns="" w="9525">
+                <a14:hiddenLine xmlns="" xmlns:a14="http://schemas.microsoft.com/office/drawing/2010/main" w="9525">
                   <a:solidFill>
                     <a:srgbClr val="000000"/>
                   </a:solidFill>
@@ -1990,7 +2005,7 @@
             </a:ln>
             <a:extLst>
               <a:ext uri="{91240B29-F687-4f45-9708-019B960494DF}">
-                <a14:hiddenLine xmlns:a14="http://schemas.microsoft.com/office/drawing/2010/main" xmlns="" w="9525">
+                <a14:hiddenLine xmlns="" xmlns:a14="http://schemas.microsoft.com/office/drawing/2010/main" w="9525">
                   <a:solidFill>
                     <a:srgbClr val="000000"/>
                   </a:solidFill>
@@ -2058,7 +2073,7 @@
             </a:ln>
             <a:extLst>
               <a:ext uri="{91240B29-F687-4f45-9708-019B960494DF}">
-                <a14:hiddenLine xmlns:a14="http://schemas.microsoft.com/office/drawing/2010/main" xmlns="" w="9525">
+                <a14:hiddenLine xmlns="" xmlns:a14="http://schemas.microsoft.com/office/drawing/2010/main" w="9525">
                   <a:solidFill>
                     <a:srgbClr val="000000"/>
                   </a:solidFill>
@@ -2148,7 +2163,7 @@
             </a:ln>
             <a:extLst>
               <a:ext uri="{91240B29-F687-4f45-9708-019B960494DF}">
-                <a14:hiddenLine xmlns:a14="http://schemas.microsoft.com/office/drawing/2010/main" xmlns="" w="9525">
+                <a14:hiddenLine xmlns="" xmlns:a14="http://schemas.microsoft.com/office/drawing/2010/main" w="9525">
                   <a:solidFill>
                     <a:srgbClr val="000000"/>
                   </a:solidFill>
@@ -2216,7 +2231,7 @@
             </a:ln>
             <a:extLst>
               <a:ext uri="{91240B29-F687-4f45-9708-019B960494DF}">
-                <a14:hiddenLine xmlns:a14="http://schemas.microsoft.com/office/drawing/2010/main" xmlns="" w="9525">
+                <a14:hiddenLine xmlns="" xmlns:a14="http://schemas.microsoft.com/office/drawing/2010/main" w="9525">
                   <a:solidFill>
                     <a:srgbClr val="000000"/>
                   </a:solidFill>
@@ -2306,7 +2321,7 @@
             </a:ln>
             <a:extLst>
               <a:ext uri="{91240B29-F687-4f45-9708-019B960494DF}">
-                <a14:hiddenLine xmlns:a14="http://schemas.microsoft.com/office/drawing/2010/main" xmlns="" w="9525">
+                <a14:hiddenLine xmlns="" xmlns:a14="http://schemas.microsoft.com/office/drawing/2010/main" w="9525">
                   <a:solidFill>
                     <a:srgbClr val="000000"/>
                   </a:solidFill>
@@ -2340,7 +2355,7 @@
             </a:ln>
             <a:extLst>
               <a:ext uri="{91240B29-F687-4f45-9708-019B960494DF}">
-                <a14:hiddenLine xmlns:a14="http://schemas.microsoft.com/office/drawing/2010/main" xmlns="" w="9525">
+                <a14:hiddenLine xmlns="" xmlns:a14="http://schemas.microsoft.com/office/drawing/2010/main" w="9525">
                   <a:solidFill>
                     <a:srgbClr val="000000"/>
                   </a:solidFill>
@@ -2430,7 +2445,7 @@
             </a:ln>
             <a:extLst>
               <a:ext uri="{91240B29-F687-4f45-9708-019B960494DF}">
-                <a14:hiddenLine xmlns:a14="http://schemas.microsoft.com/office/drawing/2010/main" xmlns="" w="9525">
+                <a14:hiddenLine xmlns="" xmlns:a14="http://schemas.microsoft.com/office/drawing/2010/main" w="9525">
                   <a:solidFill>
                     <a:srgbClr val="000000"/>
                   </a:solidFill>
@@ -2492,7 +2507,7 @@
             </a:ln>
             <a:extLst>
               <a:ext uri="{91240B29-F687-4f45-9708-019B960494DF}">
-                <a14:hiddenLine xmlns:a14="http://schemas.microsoft.com/office/drawing/2010/main" xmlns="" w="9525">
+                <a14:hiddenLine xmlns="" xmlns:a14="http://schemas.microsoft.com/office/drawing/2010/main" w="9525">
                   <a:solidFill>
                     <a:srgbClr val="000000"/>
                   </a:solidFill>
@@ -2554,7 +2569,7 @@
             </a:ln>
             <a:extLst>
               <a:ext uri="{91240B29-F687-4f45-9708-019B960494DF}">
-                <a14:hiddenLine xmlns:a14="http://schemas.microsoft.com/office/drawing/2010/main" xmlns="" w="9525">
+                <a14:hiddenLine xmlns="" xmlns:a14="http://schemas.microsoft.com/office/drawing/2010/main" w="9525">
                   <a:solidFill>
                     <a:srgbClr val="000000"/>
                   </a:solidFill>
@@ -2644,7 +2659,7 @@
             </a:ln>
             <a:extLst>
               <a:ext uri="{91240B29-F687-4f45-9708-019B960494DF}">
-                <a14:hiddenLine xmlns:a14="http://schemas.microsoft.com/office/drawing/2010/main" xmlns="" w="9525">
+                <a14:hiddenLine xmlns="" xmlns:a14="http://schemas.microsoft.com/office/drawing/2010/main" w="9525">
                   <a:solidFill>
                     <a:srgbClr val="000000"/>
                   </a:solidFill>
@@ -2712,7 +2727,7 @@
             </a:ln>
             <a:extLst>
               <a:ext uri="{91240B29-F687-4f45-9708-019B960494DF}">
-                <a14:hiddenLine xmlns:a14="http://schemas.microsoft.com/office/drawing/2010/main" xmlns="" w="9525">
+                <a14:hiddenLine xmlns="" xmlns:a14="http://schemas.microsoft.com/office/drawing/2010/main" w="9525">
                   <a:solidFill>
                     <a:srgbClr val="000000"/>
                   </a:solidFill>
@@ -2774,7 +2789,7 @@
             </a:ln>
             <a:extLst>
               <a:ext uri="{91240B29-F687-4f45-9708-019B960494DF}">
-                <a14:hiddenLine xmlns:a14="http://schemas.microsoft.com/office/drawing/2010/main" xmlns="" w="9525">
+                <a14:hiddenLine xmlns="" xmlns:a14="http://schemas.microsoft.com/office/drawing/2010/main" w="9525">
                   <a:solidFill>
                     <a:srgbClr val="000000"/>
                   </a:solidFill>
@@ -2864,7 +2879,7 @@
             </a:ln>
             <a:extLst>
               <a:ext uri="{91240B29-F687-4f45-9708-019B960494DF}">
-                <a14:hiddenLine xmlns:a14="http://schemas.microsoft.com/office/drawing/2010/main" xmlns="" w="9525">
+                <a14:hiddenLine xmlns="" xmlns:a14="http://schemas.microsoft.com/office/drawing/2010/main" w="9525">
                   <a:solidFill>
                     <a:srgbClr val="000000"/>
                   </a:solidFill>
@@ -2926,7 +2941,7 @@
             </a:ln>
             <a:extLst>
               <a:ext uri="{91240B29-F687-4f45-9708-019B960494DF}">
-                <a14:hiddenLine xmlns:a14="http://schemas.microsoft.com/office/drawing/2010/main" xmlns="" w="9525">
+                <a14:hiddenLine xmlns="" xmlns:a14="http://schemas.microsoft.com/office/drawing/2010/main" w="9525">
                   <a:solidFill>
                     <a:srgbClr val="000000"/>
                   </a:solidFill>
@@ -3016,7 +3031,7 @@
             </a:ln>
             <a:extLst>
               <a:ext uri="{91240B29-F687-4f45-9708-019B960494DF}">
-                <a14:hiddenLine xmlns:a14="http://schemas.microsoft.com/office/drawing/2010/main" xmlns="" w="9525">
+                <a14:hiddenLine xmlns="" xmlns:a14="http://schemas.microsoft.com/office/drawing/2010/main" w="9525">
                   <a:solidFill>
                     <a:srgbClr val="000000"/>
                   </a:solidFill>
@@ -3078,7 +3093,7 @@
             </a:ln>
             <a:extLst>
               <a:ext uri="{91240B29-F687-4f45-9708-019B960494DF}">
-                <a14:hiddenLine xmlns:a14="http://schemas.microsoft.com/office/drawing/2010/main" xmlns="" w="9525">
+                <a14:hiddenLine xmlns="" xmlns:a14="http://schemas.microsoft.com/office/drawing/2010/main" w="9525">
                   <a:solidFill>
                     <a:srgbClr val="000000"/>
                   </a:solidFill>
@@ -3168,7 +3183,7 @@
             </a:ln>
             <a:extLst>
               <a:ext uri="{91240B29-F687-4f45-9708-019B960494DF}">
-                <a14:hiddenLine xmlns:a14="http://schemas.microsoft.com/office/drawing/2010/main" xmlns="" w="9525">
+                <a14:hiddenLine xmlns="" xmlns:a14="http://schemas.microsoft.com/office/drawing/2010/main" w="9525">
                   <a:solidFill>
                     <a:srgbClr val="000000"/>
                   </a:solidFill>
@@ -3202,7 +3217,7 @@
             </a:ln>
             <a:extLst>
               <a:ext uri="{91240B29-F687-4f45-9708-019B960494DF}">
-                <a14:hiddenLine xmlns:a14="http://schemas.microsoft.com/office/drawing/2010/main" xmlns="" w="9525">
+                <a14:hiddenLine xmlns="" xmlns:a14="http://schemas.microsoft.com/office/drawing/2010/main" w="9525">
                   <a:solidFill>
                     <a:srgbClr val="000000"/>
                   </a:solidFill>
@@ -3267,7 +3282,7 @@
             </a:ln>
             <a:extLst>
               <a:ext uri="{91240B29-F687-4f45-9708-019B960494DF}">
-                <a14:hiddenLine xmlns:a14="http://schemas.microsoft.com/office/drawing/2010/main" xmlns="" w="9525">
+                <a14:hiddenLine xmlns="" xmlns:a14="http://schemas.microsoft.com/office/drawing/2010/main" w="9525">
                   <a:solidFill>
                     <a:srgbClr val="000000"/>
                   </a:solidFill>
@@ -3357,7 +3372,7 @@
             </a:ln>
             <a:extLst>
               <a:ext uri="{91240B29-F687-4f45-9708-019B960494DF}">
-                <a14:hiddenLine xmlns:a14="http://schemas.microsoft.com/office/drawing/2010/main" xmlns="" w="9525">
+                <a14:hiddenLine xmlns="" xmlns:a14="http://schemas.microsoft.com/office/drawing/2010/main" w="9525">
                   <a:solidFill>
                     <a:srgbClr val="000000"/>
                   </a:solidFill>
@@ -3419,7 +3434,7 @@
             </a:ln>
             <a:extLst>
               <a:ext uri="{91240B29-F687-4f45-9708-019B960494DF}">
-                <a14:hiddenLine xmlns:a14="http://schemas.microsoft.com/office/drawing/2010/main" xmlns="" w="9525">
+                <a14:hiddenLine xmlns="" xmlns:a14="http://schemas.microsoft.com/office/drawing/2010/main" w="9525">
                   <a:solidFill>
                     <a:srgbClr val="000000"/>
                   </a:solidFill>
@@ -3509,7 +3524,7 @@
             </a:ln>
             <a:extLst>
               <a:ext uri="{91240B29-F687-4f45-9708-019B960494DF}">
-                <a14:hiddenLine xmlns:a14="http://schemas.microsoft.com/office/drawing/2010/main" xmlns="" w="9525">
+                <a14:hiddenLine xmlns="" xmlns:a14="http://schemas.microsoft.com/office/drawing/2010/main" w="9525">
                   <a:solidFill>
                     <a:srgbClr val="000000"/>
                   </a:solidFill>
@@ -3599,7 +3614,7 @@
             </a:ln>
             <a:extLst>
               <a:ext uri="{91240B29-F687-4f45-9708-019B960494DF}">
-                <a14:hiddenLine xmlns:a14="http://schemas.microsoft.com/office/drawing/2010/main" xmlns="" w="9525">
+                <a14:hiddenLine xmlns="" xmlns:a14="http://schemas.microsoft.com/office/drawing/2010/main" w="9525">
                   <a:solidFill>
                     <a:srgbClr val="000000"/>
                   </a:solidFill>
@@ -3664,7 +3679,7 @@
             </a:ln>
             <a:extLst>
               <a:ext uri="{91240B29-F687-4f45-9708-019B960494DF}">
-                <a14:hiddenLine xmlns:a14="http://schemas.microsoft.com/office/drawing/2010/main" xmlns="" w="9525">
+                <a14:hiddenLine xmlns="" xmlns:a14="http://schemas.microsoft.com/office/drawing/2010/main" w="9525">
                   <a:solidFill>
                     <a:srgbClr val="000000"/>
                   </a:solidFill>
@@ -3726,7 +3741,7 @@
             </a:ln>
             <a:extLst>
               <a:ext uri="{91240B29-F687-4f45-9708-019B960494DF}">
-                <a14:hiddenLine xmlns:a14="http://schemas.microsoft.com/office/drawing/2010/main" xmlns="" w="9525">
+                <a14:hiddenLine xmlns="" xmlns:a14="http://schemas.microsoft.com/office/drawing/2010/main" w="9525">
                   <a:solidFill>
                     <a:srgbClr val="000000"/>
                   </a:solidFill>
@@ -3816,7 +3831,7 @@
             </a:ln>
             <a:extLst>
               <a:ext uri="{91240B29-F687-4f45-9708-019B960494DF}">
-                <a14:hiddenLine xmlns:a14="http://schemas.microsoft.com/office/drawing/2010/main" xmlns="" w="9525">
+                <a14:hiddenLine xmlns="" xmlns:a14="http://schemas.microsoft.com/office/drawing/2010/main" w="9525">
                   <a:solidFill>
                     <a:srgbClr val="000000"/>
                   </a:solidFill>
@@ -3906,7 +3921,7 @@
             </a:ln>
             <a:extLst>
               <a:ext uri="{91240B29-F687-4f45-9708-019B960494DF}">
-                <a14:hiddenLine xmlns:a14="http://schemas.microsoft.com/office/drawing/2010/main" xmlns="" w="9525">
+                <a14:hiddenLine xmlns="" xmlns:a14="http://schemas.microsoft.com/office/drawing/2010/main" w="9525">
                   <a:solidFill>
                     <a:srgbClr val="000000"/>
                   </a:solidFill>
@@ -3968,7 +3983,7 @@
             </a:ln>
             <a:extLst>
               <a:ext uri="{91240B29-F687-4f45-9708-019B960494DF}">
-                <a14:hiddenLine xmlns:a14="http://schemas.microsoft.com/office/drawing/2010/main" xmlns="" w="9525">
+                <a14:hiddenLine xmlns="" xmlns:a14="http://schemas.microsoft.com/office/drawing/2010/main" w="9525">
                   <a:solidFill>
                     <a:srgbClr val="000000"/>
                   </a:solidFill>
@@ -4088,7 +4103,7 @@
             </a:ln>
             <a:extLst>
               <a:ext uri="{91240B29-F687-4f45-9708-019B960494DF}">
-                <a14:hiddenLine xmlns:a14="http://schemas.microsoft.com/office/drawing/2010/main" xmlns="" w="9525">
+                <a14:hiddenLine xmlns="" xmlns:a14="http://schemas.microsoft.com/office/drawing/2010/main" w="9525">
                   <a:solidFill>
                     <a:srgbClr val="000000"/>
                   </a:solidFill>
@@ -4156,7 +4171,7 @@
             </a:ln>
             <a:extLst>
               <a:ext uri="{91240B29-F687-4f45-9708-019B960494DF}">
-                <a14:hiddenLine xmlns:a14="http://schemas.microsoft.com/office/drawing/2010/main" xmlns="" w="9525">
+                <a14:hiddenLine xmlns="" xmlns:a14="http://schemas.microsoft.com/office/drawing/2010/main" w="9525">
                   <a:solidFill>
                     <a:srgbClr val="000000"/>
                   </a:solidFill>
@@ -4246,7 +4261,7 @@
             </a:ln>
             <a:extLst>
               <a:ext uri="{91240B29-F687-4f45-9708-019B960494DF}">
-                <a14:hiddenLine xmlns:a14="http://schemas.microsoft.com/office/drawing/2010/main" xmlns="" w="9525">
+                <a14:hiddenLine xmlns="" xmlns:a14="http://schemas.microsoft.com/office/drawing/2010/main" w="9525">
                   <a:solidFill>
                     <a:srgbClr val="000000"/>
                   </a:solidFill>
@@ -4386,7 +4401,7 @@
           <a:p>
             <a:fld id="{48A87A34-81AB-432B-8DAE-1953F412C126}" type="datetimeFigureOut">
               <a:rPr lang="en-US" dirty="0"/>
-              <a:t>4/19/2016</a:t>
+              <a:t>4/20/16</a:t>
             </a:fld>
             <a:endParaRPr lang="en-US" dirty="0"/>
           </a:p>
@@ -4648,7 +4663,7 @@
           <a:p>
             <a:fld id="{48A87A34-81AB-432B-8DAE-1953F412C126}" type="datetimeFigureOut">
               <a:rPr lang="en-US" dirty="0"/>
-              <a:t>4/19/2016</a:t>
+              <a:t>4/20/16</a:t>
             </a:fld>
             <a:endParaRPr lang="en-US" dirty="0"/>
           </a:p>
@@ -4839,7 +4854,7 @@
           <a:p>
             <a:fld id="{48A87A34-81AB-432B-8DAE-1953F412C126}" type="datetimeFigureOut">
               <a:rPr lang="en-US" dirty="0"/>
-              <a:t>4/19/2016</a:t>
+              <a:t>4/20/16</a:t>
             </a:fld>
             <a:endParaRPr lang="en-US" dirty="0"/>
           </a:p>
@@ -5097,7 +5112,7 @@
           <a:p>
             <a:fld id="{48A87A34-81AB-432B-8DAE-1953F412C126}" type="datetimeFigureOut">
               <a:rPr lang="en-US" dirty="0"/>
-              <a:t>4/19/2016</a:t>
+              <a:t>4/20/16</a:t>
             </a:fld>
             <a:endParaRPr lang="en-US" dirty="0"/>
           </a:p>
@@ -5526,7 +5541,7 @@
           <a:p>
             <a:fld id="{48A87A34-81AB-432B-8DAE-1953F412C126}" type="datetimeFigureOut">
               <a:rPr lang="en-US" dirty="0"/>
-              <a:t>4/19/2016</a:t>
+              <a:t>4/20/16</a:t>
             </a:fld>
             <a:endParaRPr lang="en-US" dirty="0"/>
           </a:p>
@@ -6067,7 +6082,7 @@
           <a:p>
             <a:fld id="{48A87A34-81AB-432B-8DAE-1953F412C126}" type="datetimeFigureOut">
               <a:rPr lang="en-US" dirty="0"/>
-              <a:t>4/19/2016</a:t>
+              <a:t>4/20/16</a:t>
             </a:fld>
             <a:endParaRPr lang="en-US" dirty="0"/>
           </a:p>
@@ -6782,7 +6797,7 @@
           <a:p>
             <a:fld id="{48A87A34-81AB-432B-8DAE-1953F412C126}" type="datetimeFigureOut">
               <a:rPr lang="en-US" dirty="0"/>
-              <a:t>4/19/2016</a:t>
+              <a:t>4/20/16</a:t>
             </a:fld>
             <a:endParaRPr lang="en-US" dirty="0"/>
           </a:p>
@@ -6947,7 +6962,7 @@
           <a:p>
             <a:fld id="{48A87A34-81AB-432B-8DAE-1953F412C126}" type="datetimeFigureOut">
               <a:rPr lang="en-US" dirty="0"/>
-              <a:t>4/19/2016</a:t>
+              <a:t>4/20/16</a:t>
             </a:fld>
             <a:endParaRPr lang="en-US" dirty="0"/>
           </a:p>
@@ -7122,7 +7137,7 @@
           <a:p>
             <a:fld id="{48A87A34-81AB-432B-8DAE-1953F412C126}" type="datetimeFigureOut">
               <a:rPr lang="en-US" dirty="0"/>
-              <a:t>4/19/2016</a:t>
+              <a:t>4/20/16</a:t>
             </a:fld>
             <a:endParaRPr lang="en-US" dirty="0"/>
           </a:p>
@@ -7287,7 +7302,7 @@
           <a:p>
             <a:fld id="{48A87A34-81AB-432B-8DAE-1953F412C126}" type="datetimeFigureOut">
               <a:rPr lang="en-US" dirty="0"/>
-              <a:t>4/19/2016</a:t>
+              <a:t>4/20/16</a:t>
             </a:fld>
             <a:endParaRPr lang="en-US" dirty="0"/>
           </a:p>
@@ -7532,7 +7547,7 @@
           <a:p>
             <a:fld id="{48A87A34-81AB-432B-8DAE-1953F412C126}" type="datetimeFigureOut">
               <a:rPr lang="en-US" dirty="0"/>
-              <a:t>4/19/2016</a:t>
+              <a:t>4/20/16</a:t>
             </a:fld>
             <a:endParaRPr lang="en-US" dirty="0"/>
           </a:p>
@@ -7759,7 +7774,7 @@
           <a:p>
             <a:fld id="{48A87A34-81AB-432B-8DAE-1953F412C126}" type="datetimeFigureOut">
               <a:rPr lang="en-US" dirty="0"/>
-              <a:t>4/19/2016</a:t>
+              <a:t>4/20/16</a:t>
             </a:fld>
             <a:endParaRPr lang="en-US" dirty="0"/>
           </a:p>
@@ -8135,7 +8150,7 @@
           <a:p>
             <a:fld id="{48A87A34-81AB-432B-8DAE-1953F412C126}" type="datetimeFigureOut">
               <a:rPr lang="en-US" dirty="0"/>
-              <a:t>4/19/2016</a:t>
+              <a:t>4/20/16</a:t>
             </a:fld>
             <a:endParaRPr lang="en-US" dirty="0"/>
           </a:p>
@@ -8248,7 +8263,7 @@
           <a:p>
             <a:fld id="{48A87A34-81AB-432B-8DAE-1953F412C126}" type="datetimeFigureOut">
               <a:rPr lang="en-US" dirty="0"/>
-              <a:t>4/19/2016</a:t>
+              <a:t>4/20/16</a:t>
             </a:fld>
             <a:endParaRPr lang="en-US" dirty="0"/>
           </a:p>
@@ -8338,7 +8353,7 @@
           <a:p>
             <a:fld id="{48A87A34-81AB-432B-8DAE-1953F412C126}" type="datetimeFigureOut">
               <a:rPr lang="en-US" dirty="0"/>
-              <a:t>4/19/2016</a:t>
+              <a:t>4/20/16</a:t>
             </a:fld>
             <a:endParaRPr lang="en-US" dirty="0"/>
           </a:p>
@@ -8582,7 +8597,7 @@
           <a:p>
             <a:fld id="{48A87A34-81AB-432B-8DAE-1953F412C126}" type="datetimeFigureOut">
               <a:rPr lang="en-US" dirty="0"/>
-              <a:t>4/19/2016</a:t>
+              <a:t>4/20/16</a:t>
             </a:fld>
             <a:endParaRPr lang="en-US" dirty="0"/>
           </a:p>
@@ -8857,7 +8872,7 @@
           <a:p>
             <a:fld id="{48A87A34-81AB-432B-8DAE-1953F412C126}" type="datetimeFigureOut">
               <a:rPr lang="en-US" dirty="0"/>
-              <a:t>4/19/2016</a:t>
+              <a:t>4/20/16</a:t>
             </a:fld>
             <a:endParaRPr lang="en-US" dirty="0"/>
           </a:p>
@@ -8968,7 +8983,7 @@
           <a:noFill/>
           <a:extLst>
             <a:ext uri="{909E8E84-426E-40dd-AFC4-6F175D3DCCD1}">
-              <a14:hiddenFill xmlns:a14="http://schemas.microsoft.com/office/drawing/2010/main" xmlns="">
+              <a14:hiddenFill xmlns="" xmlns:a14="http://schemas.microsoft.com/office/drawing/2010/main">
                 <a:solidFill>
                   <a:srgbClr val="FFFFFF"/>
                 </a:solidFill>
@@ -9042,7 +9057,7 @@
               </a:ln>
               <a:extLst>
                 <a:ext uri="{91240B29-F687-4f45-9708-019B960494DF}">
-                  <a14:hiddenLine xmlns:a14="http://schemas.microsoft.com/office/drawing/2010/main" xmlns="" w="9525">
+                  <a14:hiddenLine xmlns="" xmlns:a14="http://schemas.microsoft.com/office/drawing/2010/main" w="9525">
                     <a:solidFill>
                       <a:srgbClr val="000000"/>
                     </a:solidFill>
@@ -9132,7 +9147,7 @@
               </a:ln>
               <a:extLst>
                 <a:ext uri="{91240B29-F687-4f45-9708-019B960494DF}">
-                  <a14:hiddenLine xmlns:a14="http://schemas.microsoft.com/office/drawing/2010/main" xmlns="" w="9525">
+                  <a14:hiddenLine xmlns="" xmlns:a14="http://schemas.microsoft.com/office/drawing/2010/main" w="9525">
                     <a:solidFill>
                       <a:srgbClr val="000000"/>
                     </a:solidFill>
@@ -9222,7 +9237,7 @@
               </a:ln>
               <a:extLst>
                 <a:ext uri="{91240B29-F687-4f45-9708-019B960494DF}">
-                  <a14:hiddenLine xmlns:a14="http://schemas.microsoft.com/office/drawing/2010/main" xmlns="" w="9525">
+                  <a14:hiddenLine xmlns="" xmlns:a14="http://schemas.microsoft.com/office/drawing/2010/main" w="9525">
                     <a:solidFill>
                       <a:srgbClr val="000000"/>
                     </a:solidFill>
@@ -9284,7 +9299,7 @@
               </a:ln>
               <a:extLst>
                 <a:ext uri="{91240B29-F687-4f45-9708-019B960494DF}">
-                  <a14:hiddenLine xmlns:a14="http://schemas.microsoft.com/office/drawing/2010/main" xmlns="" w="9525">
+                  <a14:hiddenLine xmlns="" xmlns:a14="http://schemas.microsoft.com/office/drawing/2010/main" w="9525">
                     <a:solidFill>
                       <a:srgbClr val="000000"/>
                     </a:solidFill>
@@ -9374,7 +9389,7 @@
               </a:ln>
               <a:extLst>
                 <a:ext uri="{91240B29-F687-4f45-9708-019B960494DF}">
-                  <a14:hiddenLine xmlns:a14="http://schemas.microsoft.com/office/drawing/2010/main" xmlns="" w="9525">
+                  <a14:hiddenLine xmlns="" xmlns:a14="http://schemas.microsoft.com/office/drawing/2010/main" w="9525">
                     <a:solidFill>
                       <a:srgbClr val="000000"/>
                     </a:solidFill>
@@ -9436,7 +9451,7 @@
               </a:ln>
               <a:extLst>
                 <a:ext uri="{91240B29-F687-4f45-9708-019B960494DF}">
-                  <a14:hiddenLine xmlns:a14="http://schemas.microsoft.com/office/drawing/2010/main" xmlns="" w="9525">
+                  <a14:hiddenLine xmlns="" xmlns:a14="http://schemas.microsoft.com/office/drawing/2010/main" w="9525">
                     <a:solidFill>
                       <a:srgbClr val="000000"/>
                     </a:solidFill>
@@ -9498,7 +9513,7 @@
               </a:ln>
               <a:extLst>
                 <a:ext uri="{91240B29-F687-4f45-9708-019B960494DF}">
-                  <a14:hiddenLine xmlns:a14="http://schemas.microsoft.com/office/drawing/2010/main" xmlns="" w="9525">
+                  <a14:hiddenLine xmlns="" xmlns:a14="http://schemas.microsoft.com/office/drawing/2010/main" w="9525">
                     <a:solidFill>
                       <a:srgbClr val="000000"/>
                     </a:solidFill>
@@ -9588,7 +9603,7 @@
               </a:ln>
               <a:extLst>
                 <a:ext uri="{91240B29-F687-4f45-9708-019B960494DF}">
-                  <a14:hiddenLine xmlns:a14="http://schemas.microsoft.com/office/drawing/2010/main" xmlns="" w="9525">
+                  <a14:hiddenLine xmlns="" xmlns:a14="http://schemas.microsoft.com/office/drawing/2010/main" w="9525">
                     <a:solidFill>
                       <a:srgbClr val="000000"/>
                     </a:solidFill>
@@ -9678,7 +9693,7 @@
               </a:ln>
               <a:extLst>
                 <a:ext uri="{91240B29-F687-4f45-9708-019B960494DF}">
-                  <a14:hiddenLine xmlns:a14="http://schemas.microsoft.com/office/drawing/2010/main" xmlns="" w="9525">
+                  <a14:hiddenLine xmlns="" xmlns:a14="http://schemas.microsoft.com/office/drawing/2010/main" w="9525">
                     <a:solidFill>
                       <a:srgbClr val="000000"/>
                     </a:solidFill>
@@ -9740,7 +9755,7 @@
               </a:ln>
               <a:extLst>
                 <a:ext uri="{91240B29-F687-4f45-9708-019B960494DF}">
-                  <a14:hiddenLine xmlns:a14="http://schemas.microsoft.com/office/drawing/2010/main" xmlns="" w="9525">
+                  <a14:hiddenLine xmlns="" xmlns:a14="http://schemas.microsoft.com/office/drawing/2010/main" w="9525">
                     <a:solidFill>
                       <a:srgbClr val="000000"/>
                     </a:solidFill>
@@ -9850,7 +9865,7 @@
               </a:ln>
               <a:extLst>
                 <a:ext uri="{91240B29-F687-4f45-9708-019B960494DF}">
-                  <a14:hiddenLine xmlns:a14="http://schemas.microsoft.com/office/drawing/2010/main" xmlns="" w="9525">
+                  <a14:hiddenLine xmlns="" xmlns:a14="http://schemas.microsoft.com/office/drawing/2010/main" w="9525">
                     <a:solidFill>
                       <a:srgbClr val="000000"/>
                     </a:solidFill>
@@ -9934,7 +9949,7 @@
               </a:ln>
               <a:extLst>
                 <a:ext uri="{91240B29-F687-4f45-9708-019B960494DF}">
-                  <a14:hiddenLine xmlns:a14="http://schemas.microsoft.com/office/drawing/2010/main" xmlns="" w="9525">
+                  <a14:hiddenLine xmlns="" xmlns:a14="http://schemas.microsoft.com/office/drawing/2010/main" w="9525">
                     <a:solidFill>
                       <a:srgbClr val="000000"/>
                     </a:solidFill>
@@ -9996,7 +10011,7 @@
               </a:ln>
               <a:extLst>
                 <a:ext uri="{91240B29-F687-4f45-9708-019B960494DF}">
-                  <a14:hiddenLine xmlns:a14="http://schemas.microsoft.com/office/drawing/2010/main" xmlns="" w="9525">
+                  <a14:hiddenLine xmlns="" xmlns:a14="http://schemas.microsoft.com/office/drawing/2010/main" w="9525">
                     <a:solidFill>
                       <a:srgbClr val="000000"/>
                     </a:solidFill>
@@ -10058,7 +10073,7 @@
               </a:ln>
               <a:extLst>
                 <a:ext uri="{91240B29-F687-4f45-9708-019B960494DF}">
-                  <a14:hiddenLine xmlns:a14="http://schemas.microsoft.com/office/drawing/2010/main" xmlns="" w="9525">
+                  <a14:hiddenLine xmlns="" xmlns:a14="http://schemas.microsoft.com/office/drawing/2010/main" w="9525">
                     <a:solidFill>
                       <a:srgbClr val="000000"/>
                     </a:solidFill>
@@ -10148,7 +10163,7 @@
               </a:ln>
               <a:extLst>
                 <a:ext uri="{91240B29-F687-4f45-9708-019B960494DF}">
-                  <a14:hiddenLine xmlns:a14="http://schemas.microsoft.com/office/drawing/2010/main" xmlns="" w="9525">
+                  <a14:hiddenLine xmlns="" xmlns:a14="http://schemas.microsoft.com/office/drawing/2010/main" w="9525">
                     <a:solidFill>
                       <a:srgbClr val="000000"/>
                     </a:solidFill>
@@ -10182,7 +10197,7 @@
               </a:ln>
               <a:extLst>
                 <a:ext uri="{91240B29-F687-4f45-9708-019B960494DF}">
-                  <a14:hiddenLine xmlns:a14="http://schemas.microsoft.com/office/drawing/2010/main" xmlns="" w="9525">
+                  <a14:hiddenLine xmlns="" xmlns:a14="http://schemas.microsoft.com/office/drawing/2010/main" w="9525">
                     <a:solidFill>
                       <a:srgbClr val="000000"/>
                     </a:solidFill>
@@ -10247,7 +10262,7 @@
               </a:ln>
               <a:extLst>
                 <a:ext uri="{91240B29-F687-4f45-9708-019B960494DF}">
-                  <a14:hiddenLine xmlns:a14="http://schemas.microsoft.com/office/drawing/2010/main" xmlns="" w="9525">
+                  <a14:hiddenLine xmlns="" xmlns:a14="http://schemas.microsoft.com/office/drawing/2010/main" w="9525">
                     <a:solidFill>
                       <a:srgbClr val="000000"/>
                     </a:solidFill>
@@ -10337,7 +10352,7 @@
               </a:ln>
               <a:extLst>
                 <a:ext uri="{91240B29-F687-4f45-9708-019B960494DF}">
-                  <a14:hiddenLine xmlns:a14="http://schemas.microsoft.com/office/drawing/2010/main" xmlns="" w="9525">
+                  <a14:hiddenLine xmlns="" xmlns:a14="http://schemas.microsoft.com/office/drawing/2010/main" w="9525">
                     <a:solidFill>
                       <a:srgbClr val="000000"/>
                     </a:solidFill>
@@ -10399,7 +10414,7 @@
               </a:ln>
               <a:extLst>
                 <a:ext uri="{91240B29-F687-4f45-9708-019B960494DF}">
-                  <a14:hiddenLine xmlns:a14="http://schemas.microsoft.com/office/drawing/2010/main" xmlns="" w="9525">
+                  <a14:hiddenLine xmlns="" xmlns:a14="http://schemas.microsoft.com/office/drawing/2010/main" w="9525">
                     <a:solidFill>
                       <a:srgbClr val="000000"/>
                     </a:solidFill>
@@ -10489,7 +10504,7 @@
               </a:ln>
               <a:extLst>
                 <a:ext uri="{91240B29-F687-4f45-9708-019B960494DF}">
-                  <a14:hiddenLine xmlns:a14="http://schemas.microsoft.com/office/drawing/2010/main" xmlns="" w="9525">
+                  <a14:hiddenLine xmlns="" xmlns:a14="http://schemas.microsoft.com/office/drawing/2010/main" w="9525">
                     <a:solidFill>
                       <a:srgbClr val="000000"/>
                     </a:solidFill>
@@ -10554,7 +10569,7 @@
               </a:ln>
               <a:extLst>
                 <a:ext uri="{91240B29-F687-4f45-9708-019B960494DF}">
-                  <a14:hiddenLine xmlns:a14="http://schemas.microsoft.com/office/drawing/2010/main" xmlns="" w="9525">
+                  <a14:hiddenLine xmlns="" xmlns:a14="http://schemas.microsoft.com/office/drawing/2010/main" w="9525">
                     <a:solidFill>
                       <a:srgbClr val="000000"/>
                     </a:solidFill>
@@ -10616,7 +10631,7 @@
               </a:ln>
               <a:extLst>
                 <a:ext uri="{91240B29-F687-4f45-9708-019B960494DF}">
-                  <a14:hiddenLine xmlns:a14="http://schemas.microsoft.com/office/drawing/2010/main" xmlns="" w="9525">
+                  <a14:hiddenLine xmlns="" xmlns:a14="http://schemas.microsoft.com/office/drawing/2010/main" w="9525">
                     <a:solidFill>
                       <a:srgbClr val="000000"/>
                     </a:solidFill>
@@ -10706,7 +10721,7 @@
               </a:ln>
               <a:extLst>
                 <a:ext uri="{91240B29-F687-4f45-9708-019B960494DF}">
-                  <a14:hiddenLine xmlns:a14="http://schemas.microsoft.com/office/drawing/2010/main" xmlns="" w="9525">
+                  <a14:hiddenLine xmlns="" xmlns:a14="http://schemas.microsoft.com/office/drawing/2010/main" w="9525">
                     <a:solidFill>
                       <a:srgbClr val="000000"/>
                     </a:solidFill>
@@ -10796,7 +10811,7 @@
               </a:ln>
               <a:extLst>
                 <a:ext uri="{91240B29-F687-4f45-9708-019B960494DF}">
-                  <a14:hiddenLine xmlns:a14="http://schemas.microsoft.com/office/drawing/2010/main" xmlns="" w="9525">
+                  <a14:hiddenLine xmlns="" xmlns:a14="http://schemas.microsoft.com/office/drawing/2010/main" w="9525">
                     <a:solidFill>
                       <a:srgbClr val="000000"/>
                     </a:solidFill>
@@ -10861,7 +10876,7 @@
               </a:ln>
               <a:extLst>
                 <a:ext uri="{91240B29-F687-4f45-9708-019B960494DF}">
-                  <a14:hiddenLine xmlns:a14="http://schemas.microsoft.com/office/drawing/2010/main" xmlns="" w="9525">
+                  <a14:hiddenLine xmlns="" xmlns:a14="http://schemas.microsoft.com/office/drawing/2010/main" w="9525">
                     <a:solidFill>
                       <a:srgbClr val="000000"/>
                     </a:solidFill>
@@ -10981,7 +10996,7 @@
               </a:ln>
               <a:extLst>
                 <a:ext uri="{91240B29-F687-4f45-9708-019B960494DF}">
-                  <a14:hiddenLine xmlns:a14="http://schemas.microsoft.com/office/drawing/2010/main" xmlns="" w="9525">
+                  <a14:hiddenLine xmlns="" xmlns:a14="http://schemas.microsoft.com/office/drawing/2010/main" w="9525">
                     <a:solidFill>
                       <a:srgbClr val="000000"/>
                     </a:solidFill>
@@ -11079,7 +11094,7 @@
               </a:ln>
               <a:extLst>
                 <a:ext uri="{91240B29-F687-4f45-9708-019B960494DF}">
-                  <a14:hiddenLine xmlns:a14="http://schemas.microsoft.com/office/drawing/2010/main" xmlns="" w="9525">
+                  <a14:hiddenLine xmlns="" xmlns:a14="http://schemas.microsoft.com/office/drawing/2010/main" w="9525">
                     <a:solidFill>
                       <a:srgbClr val="000000"/>
                     </a:solidFill>
@@ -11194,7 +11209,7 @@
               </a:ln>
               <a:extLst>
                 <a:ext uri="{91240B29-F687-4f45-9708-019B960494DF}">
-                  <a14:hiddenLine xmlns:a14="http://schemas.microsoft.com/office/drawing/2010/main" xmlns="" w="9525">
+                  <a14:hiddenLine xmlns="" xmlns:a14="http://schemas.microsoft.com/office/drawing/2010/main" w="9525">
                     <a:solidFill>
                       <a:srgbClr val="000000"/>
                     </a:solidFill>
@@ -11284,7 +11299,7 @@
               </a:ln>
               <a:extLst>
                 <a:ext uri="{91240B29-F687-4f45-9708-019B960494DF}">
-                  <a14:hiddenLine xmlns:a14="http://schemas.microsoft.com/office/drawing/2010/main" xmlns="" w="9525">
+                  <a14:hiddenLine xmlns="" xmlns:a14="http://schemas.microsoft.com/office/drawing/2010/main" w="9525">
                     <a:solidFill>
                       <a:srgbClr val="000000"/>
                     </a:solidFill>
@@ -11349,7 +11364,7 @@
               </a:ln>
               <a:extLst>
                 <a:ext uri="{91240B29-F687-4f45-9708-019B960494DF}">
-                  <a14:hiddenLine xmlns:a14="http://schemas.microsoft.com/office/drawing/2010/main" xmlns="" w="9525">
+                  <a14:hiddenLine xmlns="" xmlns:a14="http://schemas.microsoft.com/office/drawing/2010/main" w="9525">
                     <a:solidFill>
                       <a:srgbClr val="000000"/>
                     </a:solidFill>
@@ -11439,7 +11454,7 @@
               </a:ln>
               <a:extLst>
                 <a:ext uri="{91240B29-F687-4f45-9708-019B960494DF}">
-                  <a14:hiddenLine xmlns:a14="http://schemas.microsoft.com/office/drawing/2010/main" xmlns="" w="9525">
+                  <a14:hiddenLine xmlns="" xmlns:a14="http://schemas.microsoft.com/office/drawing/2010/main" w="9525">
                     <a:solidFill>
                       <a:srgbClr val="000000"/>
                     </a:solidFill>
@@ -11507,7 +11522,7 @@
               </a:ln>
               <a:extLst>
                 <a:ext uri="{91240B29-F687-4f45-9708-019B960494DF}">
-                  <a14:hiddenLine xmlns:a14="http://schemas.microsoft.com/office/drawing/2010/main" xmlns="" w="9525">
+                  <a14:hiddenLine xmlns="" xmlns:a14="http://schemas.microsoft.com/office/drawing/2010/main" w="9525">
                     <a:solidFill>
                       <a:srgbClr val="000000"/>
                     </a:solidFill>
@@ -11597,7 +11612,7 @@
               </a:ln>
               <a:extLst>
                 <a:ext uri="{91240B29-F687-4f45-9708-019B960494DF}">
-                  <a14:hiddenLine xmlns:a14="http://schemas.microsoft.com/office/drawing/2010/main" xmlns="" w="9525">
+                  <a14:hiddenLine xmlns="" xmlns:a14="http://schemas.microsoft.com/office/drawing/2010/main" w="9525">
                     <a:solidFill>
                       <a:srgbClr val="000000"/>
                     </a:solidFill>
@@ -11665,7 +11680,7 @@
               </a:ln>
               <a:extLst>
                 <a:ext uri="{91240B29-F687-4f45-9708-019B960494DF}">
-                  <a14:hiddenLine xmlns:a14="http://schemas.microsoft.com/office/drawing/2010/main" xmlns="" w="9525">
+                  <a14:hiddenLine xmlns="" xmlns:a14="http://schemas.microsoft.com/office/drawing/2010/main" w="9525">
                     <a:solidFill>
                       <a:srgbClr val="000000"/>
                     </a:solidFill>
@@ -11755,7 +11770,7 @@
               </a:ln>
               <a:extLst>
                 <a:ext uri="{91240B29-F687-4f45-9708-019B960494DF}">
-                  <a14:hiddenLine xmlns:a14="http://schemas.microsoft.com/office/drawing/2010/main" xmlns="" w="9525">
+                  <a14:hiddenLine xmlns="" xmlns:a14="http://schemas.microsoft.com/office/drawing/2010/main" w="9525">
                     <a:solidFill>
                       <a:srgbClr val="000000"/>
                     </a:solidFill>
@@ -11789,7 +11804,7 @@
               </a:ln>
               <a:extLst>
                 <a:ext uri="{91240B29-F687-4f45-9708-019B960494DF}">
-                  <a14:hiddenLine xmlns:a14="http://schemas.microsoft.com/office/drawing/2010/main" xmlns="" w="9525">
+                  <a14:hiddenLine xmlns="" xmlns:a14="http://schemas.microsoft.com/office/drawing/2010/main" w="9525">
                     <a:solidFill>
                       <a:srgbClr val="000000"/>
                     </a:solidFill>
@@ -11930,7 +11945,7 @@
             <a:fld id="{48A87A34-81AB-432B-8DAE-1953F412C126}" type="datetimeFigureOut">
               <a:rPr lang="en-US" dirty="0"/>
               <a:pPr/>
-              <a:t>4/19/2016</a:t>
+              <a:t>4/20/16</a:t>
             </a:fld>
             <a:endParaRPr lang="en-US" dirty="0"/>
           </a:p>
@@ -12405,6 +12420,526 @@
 </p:sld>
 </file>
 
+<file path=ppt/slides/slide10.xml><?xml version="1.0" encoding="utf-8"?>
+<p:sld xmlns:a="http://schemas.openxmlformats.org/drawingml/2006/main" xmlns:r="http://schemas.openxmlformats.org/officeDocument/2006/relationships" xmlns:p="http://schemas.openxmlformats.org/presentationml/2006/main">
+  <p:cSld>
+    <p:spTree>
+      <p:nvGrpSpPr>
+        <p:cNvPr id="1" name=""/>
+        <p:cNvGrpSpPr/>
+        <p:nvPr/>
+      </p:nvGrpSpPr>
+      <p:grpSpPr>
+        <a:xfrm>
+          <a:off x="0" y="0"/>
+          <a:ext cx="0" cy="0"/>
+          <a:chOff x="0" y="0"/>
+          <a:chExt cx="0" cy="0"/>
+        </a:xfrm>
+      </p:grpSpPr>
+      <p:sp>
+        <p:nvSpPr>
+          <p:cNvPr id="2" name="Title 1"/>
+          <p:cNvSpPr>
+            <a:spLocks noGrp="1"/>
+          </p:cNvSpPr>
+          <p:nvPr>
+            <p:ph type="title"/>
+          </p:nvPr>
+        </p:nvSpPr>
+        <p:spPr/>
+        <p:txBody>
+          <a:bodyPr/>
+          <a:lstStyle/>
+          <a:p>
+            <a:r>
+              <a:rPr lang="en-US" dirty="0" smtClean="0"/>
+              <a:t>Data requirements</a:t>
+            </a:r>
+            <a:endParaRPr lang="en-US" dirty="0"/>
+          </a:p>
+        </p:txBody>
+      </p:sp>
+      <p:sp>
+        <p:nvSpPr>
+          <p:cNvPr id="3" name="Content Placeholder 2"/>
+          <p:cNvSpPr>
+            <a:spLocks noGrp="1"/>
+          </p:cNvSpPr>
+          <p:nvPr>
+            <p:ph idx="1"/>
+          </p:nvPr>
+        </p:nvSpPr>
+        <p:spPr/>
+        <p:txBody>
+          <a:bodyPr/>
+          <a:lstStyle/>
+          <a:p>
+            <a:r>
+              <a:rPr lang="en-US" dirty="0"/>
+              <a:t>Entity Controllers shall store all relevant data to the object it is attached to.</a:t>
+            </a:r>
+            <a:r>
+              <a:rPr lang="en-US" dirty="0"/>
+              <a:t> </a:t>
+            </a:r>
+            <a:endParaRPr lang="en-US" dirty="0" smtClean="0"/>
+          </a:p>
+          <a:p>
+            <a:r>
+              <a:rPr lang="en-US" dirty="0"/>
+              <a:t>Unity built-in functions shall be used when relevant.</a:t>
+            </a:r>
+            <a:r>
+              <a:rPr lang="en-US" dirty="0"/>
+              <a:t> </a:t>
+            </a:r>
+            <a:endParaRPr lang="en-US" dirty="0" smtClean="0"/>
+          </a:p>
+          <a:p>
+            <a:endParaRPr lang="en-US" dirty="0"/>
+          </a:p>
+        </p:txBody>
+      </p:sp>
+    </p:spTree>
+    <p:extLst>
+      <p:ext uri="{BB962C8B-B14F-4D97-AF65-F5344CB8AC3E}">
+        <p14:creationId xmlns:p14="http://schemas.microsoft.com/office/powerpoint/2010/main" val="1216024772"/>
+      </p:ext>
+    </p:extLst>
+  </p:cSld>
+  <p:clrMapOvr>
+    <a:masterClrMapping/>
+  </p:clrMapOvr>
+</p:sld>
+</file>
+
+<file path=ppt/slides/slide11.xml><?xml version="1.0" encoding="utf-8"?>
+<p:sld xmlns:a="http://schemas.openxmlformats.org/drawingml/2006/main" xmlns:r="http://schemas.openxmlformats.org/officeDocument/2006/relationships" xmlns:p="http://schemas.openxmlformats.org/presentationml/2006/main">
+  <p:cSld>
+    <p:spTree>
+      <p:nvGrpSpPr>
+        <p:cNvPr id="1" name=""/>
+        <p:cNvGrpSpPr/>
+        <p:nvPr/>
+      </p:nvGrpSpPr>
+      <p:grpSpPr>
+        <a:xfrm>
+          <a:off x="0" y="0"/>
+          <a:ext cx="0" cy="0"/>
+          <a:chOff x="0" y="0"/>
+          <a:chExt cx="0" cy="0"/>
+        </a:xfrm>
+      </p:grpSpPr>
+      <p:sp>
+        <p:nvSpPr>
+          <p:cNvPr id="2" name="Title 1"/>
+          <p:cNvSpPr>
+            <a:spLocks noGrp="1"/>
+          </p:cNvSpPr>
+          <p:nvPr>
+            <p:ph type="title"/>
+          </p:nvPr>
+        </p:nvSpPr>
+        <p:spPr/>
+        <p:txBody>
+          <a:bodyPr/>
+          <a:lstStyle/>
+          <a:p>
+            <a:r>
+              <a:rPr lang="en-US" dirty="0" smtClean="0"/>
+              <a:t>Resource Requirements</a:t>
+            </a:r>
+            <a:endParaRPr lang="en-US" dirty="0"/>
+          </a:p>
+        </p:txBody>
+      </p:sp>
+      <p:sp>
+        <p:nvSpPr>
+          <p:cNvPr id="3" name="Content Placeholder 2"/>
+          <p:cNvSpPr>
+            <a:spLocks noGrp="1"/>
+          </p:cNvSpPr>
+          <p:nvPr>
+            <p:ph idx="1"/>
+          </p:nvPr>
+        </p:nvSpPr>
+        <p:spPr/>
+        <p:txBody>
+          <a:bodyPr>
+            <a:normAutofit fontScale="85000" lnSpcReduction="10000"/>
+          </a:bodyPr>
+          <a:lstStyle/>
+          <a:p>
+            <a:r>
+              <a:rPr lang="en-US" dirty="0"/>
+              <a:t>The system shall require no more than three software engineers to complete the project.</a:t>
+            </a:r>
+            <a:r>
+              <a:rPr lang="en-US" dirty="0"/>
+              <a:t> </a:t>
+            </a:r>
+            <a:endParaRPr lang="en-US" dirty="0" smtClean="0"/>
+          </a:p>
+          <a:p>
+            <a:r>
+              <a:rPr lang="en-US" dirty="0"/>
+              <a:t>The project shall be completed with Unity2D, coded in C#, and managed with </a:t>
+            </a:r>
+            <a:r>
+              <a:rPr lang="en-US" dirty="0" err="1"/>
+              <a:t>Git</a:t>
+            </a:r>
+            <a:r>
+              <a:rPr lang="en-US" dirty="0"/>
+              <a:t> version control.</a:t>
+            </a:r>
+            <a:r>
+              <a:rPr lang="en-US" dirty="0"/>
+              <a:t> </a:t>
+            </a:r>
+            <a:endParaRPr lang="en-US" dirty="0" smtClean="0"/>
+          </a:p>
+          <a:p>
+            <a:r>
+              <a:rPr lang="en-US" dirty="0"/>
+              <a:t>The project, along with its required documentation and presentation brief, shall be completed no later than 11 April 2016.</a:t>
+            </a:r>
+            <a:r>
+              <a:rPr lang="en-US" dirty="0"/>
+              <a:t> </a:t>
+            </a:r>
+            <a:endParaRPr lang="en-US" dirty="0" smtClean="0"/>
+          </a:p>
+          <a:p>
+            <a:r>
+              <a:rPr lang="en-US" dirty="0"/>
+              <a:t>The project shall be completed with only free software engineering tools.</a:t>
+            </a:r>
+            <a:r>
+              <a:rPr lang="en-US" dirty="0"/>
+              <a:t> </a:t>
+            </a:r>
+            <a:endParaRPr lang="en-US" dirty="0" smtClean="0"/>
+          </a:p>
+          <a:p>
+            <a:r>
+              <a:rPr lang="en-US" dirty="0"/>
+              <a:t>The overall size of the project, including necessary documentation, shall take no more than 1GB of memory.</a:t>
+            </a:r>
+            <a:r>
+              <a:rPr lang="en-US" dirty="0"/>
+              <a:t> </a:t>
+            </a:r>
+          </a:p>
+        </p:txBody>
+      </p:sp>
+    </p:spTree>
+    <p:extLst>
+      <p:ext uri="{BB962C8B-B14F-4D97-AF65-F5344CB8AC3E}">
+        <p14:creationId xmlns:p14="http://schemas.microsoft.com/office/powerpoint/2010/main" val="1584942216"/>
+      </p:ext>
+    </p:extLst>
+  </p:cSld>
+  <p:clrMapOvr>
+    <a:masterClrMapping/>
+  </p:clrMapOvr>
+</p:sld>
+</file>
+
+<file path=ppt/slides/slide12.xml><?xml version="1.0" encoding="utf-8"?>
+<p:sld xmlns:a="http://schemas.openxmlformats.org/drawingml/2006/main" xmlns:r="http://schemas.openxmlformats.org/officeDocument/2006/relationships" xmlns:p="http://schemas.openxmlformats.org/presentationml/2006/main">
+  <p:cSld>
+    <p:spTree>
+      <p:nvGrpSpPr>
+        <p:cNvPr id="1" name=""/>
+        <p:cNvGrpSpPr/>
+        <p:nvPr/>
+      </p:nvGrpSpPr>
+      <p:grpSpPr>
+        <a:xfrm>
+          <a:off x="0" y="0"/>
+          <a:ext cx="0" cy="0"/>
+          <a:chOff x="0" y="0"/>
+          <a:chExt cx="0" cy="0"/>
+        </a:xfrm>
+      </p:grpSpPr>
+      <p:sp>
+        <p:nvSpPr>
+          <p:cNvPr id="2" name="Title 1"/>
+          <p:cNvSpPr>
+            <a:spLocks noGrp="1"/>
+          </p:cNvSpPr>
+          <p:nvPr>
+            <p:ph type="title"/>
+          </p:nvPr>
+        </p:nvSpPr>
+        <p:spPr/>
+        <p:txBody>
+          <a:bodyPr/>
+          <a:lstStyle/>
+          <a:p>
+            <a:r>
+              <a:rPr lang="en-US" dirty="0" smtClean="0"/>
+              <a:t>Security Requirements</a:t>
+            </a:r>
+            <a:endParaRPr lang="en-US" dirty="0"/>
+          </a:p>
+        </p:txBody>
+      </p:sp>
+      <p:sp>
+        <p:nvSpPr>
+          <p:cNvPr id="3" name="Content Placeholder 2"/>
+          <p:cNvSpPr>
+            <a:spLocks noGrp="1"/>
+          </p:cNvSpPr>
+          <p:nvPr>
+            <p:ph idx="1"/>
+          </p:nvPr>
+        </p:nvSpPr>
+        <p:spPr/>
+        <p:txBody>
+          <a:bodyPr/>
+          <a:lstStyle/>
+          <a:p>
+            <a:r>
+              <a:rPr lang="en-US" dirty="0"/>
+              <a:t>The system shall remain secure during development.</a:t>
+            </a:r>
+            <a:r>
+              <a:rPr lang="en-US" dirty="0"/>
+              <a:t> </a:t>
+            </a:r>
+            <a:endParaRPr lang="en-US" dirty="0" smtClean="0"/>
+          </a:p>
+          <a:p>
+            <a:r>
+              <a:rPr lang="en-US" dirty="0"/>
+              <a:t>The system shall be stored and version controlled using </a:t>
+            </a:r>
+            <a:r>
+              <a:rPr lang="en-US" dirty="0" err="1"/>
+              <a:t>Git</a:t>
+            </a:r>
+            <a:r>
+              <a:rPr lang="en-US" dirty="0"/>
+              <a:t>.</a:t>
+            </a:r>
+            <a:r>
+              <a:rPr lang="en-US" dirty="0"/>
+              <a:t> </a:t>
+            </a:r>
+            <a:endParaRPr lang="en-US" dirty="0" smtClean="0"/>
+          </a:p>
+          <a:p>
+            <a:r>
+              <a:rPr lang="en-US" dirty="0"/>
+              <a:t>The system shall execute as a standalone application for Windows, OS X, and Linux devices.</a:t>
+            </a:r>
+            <a:r>
+              <a:rPr lang="en-US" dirty="0"/>
+              <a:t> </a:t>
+            </a:r>
+          </a:p>
+        </p:txBody>
+      </p:sp>
+    </p:spTree>
+    <p:extLst>
+      <p:ext uri="{BB962C8B-B14F-4D97-AF65-F5344CB8AC3E}">
+        <p14:creationId xmlns:p14="http://schemas.microsoft.com/office/powerpoint/2010/main" val="1738349767"/>
+      </p:ext>
+    </p:extLst>
+  </p:cSld>
+  <p:clrMapOvr>
+    <a:masterClrMapping/>
+  </p:clrMapOvr>
+</p:sld>
+</file>
+
+<file path=ppt/slides/slide13.xml><?xml version="1.0" encoding="utf-8"?>
+<p:sld xmlns:a="http://schemas.openxmlformats.org/drawingml/2006/main" xmlns:r="http://schemas.openxmlformats.org/officeDocument/2006/relationships" xmlns:p="http://schemas.openxmlformats.org/presentationml/2006/main">
+  <p:cSld>
+    <p:spTree>
+      <p:nvGrpSpPr>
+        <p:cNvPr id="1" name=""/>
+        <p:cNvGrpSpPr/>
+        <p:nvPr/>
+      </p:nvGrpSpPr>
+      <p:grpSpPr>
+        <a:xfrm>
+          <a:off x="0" y="0"/>
+          <a:ext cx="0" cy="0"/>
+          <a:chOff x="0" y="0"/>
+          <a:chExt cx="0" cy="0"/>
+        </a:xfrm>
+      </p:grpSpPr>
+      <p:sp>
+        <p:nvSpPr>
+          <p:cNvPr id="2" name="Title 1"/>
+          <p:cNvSpPr>
+            <a:spLocks noGrp="1"/>
+          </p:cNvSpPr>
+          <p:nvPr>
+            <p:ph type="title"/>
+          </p:nvPr>
+        </p:nvSpPr>
+        <p:spPr/>
+        <p:txBody>
+          <a:bodyPr/>
+          <a:lstStyle/>
+          <a:p>
+            <a:r>
+              <a:rPr lang="en-US" dirty="0" smtClean="0"/>
+              <a:t>Quality Assurance Requirements</a:t>
+            </a:r>
+            <a:endParaRPr lang="en-US" dirty="0"/>
+          </a:p>
+        </p:txBody>
+      </p:sp>
+      <p:sp>
+        <p:nvSpPr>
+          <p:cNvPr id="3" name="Content Placeholder 2"/>
+          <p:cNvSpPr>
+            <a:spLocks noGrp="1"/>
+          </p:cNvSpPr>
+          <p:nvPr>
+            <p:ph idx="1"/>
+          </p:nvPr>
+        </p:nvSpPr>
+        <p:spPr/>
+        <p:txBody>
+          <a:bodyPr/>
+          <a:lstStyle/>
+          <a:p>
+            <a:r>
+              <a:rPr lang="en-US" dirty="0"/>
+              <a:t>The system shall be readable to all speakers of the English language.</a:t>
+            </a:r>
+            <a:r>
+              <a:rPr lang="en-US" dirty="0"/>
+              <a:t> </a:t>
+            </a:r>
+            <a:endParaRPr lang="en-US" dirty="0" smtClean="0"/>
+          </a:p>
+          <a:p>
+            <a:r>
+              <a:rPr lang="en-US" dirty="0"/>
+              <a:t>The system shall minimize the required time to test.</a:t>
+            </a:r>
+            <a:r>
+              <a:rPr lang="en-US" dirty="0"/>
+              <a:t> </a:t>
+            </a:r>
+            <a:endParaRPr lang="en-US" dirty="0" smtClean="0"/>
+          </a:p>
+          <a:p>
+            <a:r>
+              <a:rPr lang="en-US" dirty="0" smtClean="0"/>
+              <a:t>The </a:t>
+            </a:r>
+            <a:r>
+              <a:rPr lang="en-US" dirty="0"/>
+              <a:t>user shall meet the minimum Unity System Requirements in order to play the video game.</a:t>
+            </a:r>
+            <a:r>
+              <a:rPr lang="en-US" dirty="0"/>
+              <a:t> </a:t>
+            </a:r>
+            <a:endParaRPr lang="en-US" dirty="0" smtClean="0"/>
+          </a:p>
+          <a:p>
+            <a:endParaRPr lang="en-US" dirty="0"/>
+          </a:p>
+        </p:txBody>
+      </p:sp>
+    </p:spTree>
+    <p:extLst>
+      <p:ext uri="{BB962C8B-B14F-4D97-AF65-F5344CB8AC3E}">
+        <p14:creationId xmlns:p14="http://schemas.microsoft.com/office/powerpoint/2010/main" val="1020853563"/>
+      </p:ext>
+    </p:extLst>
+  </p:cSld>
+  <p:clrMapOvr>
+    <a:masterClrMapping/>
+  </p:clrMapOvr>
+</p:sld>
+</file>
+
+<file path=ppt/slides/slide14.xml><?xml version="1.0" encoding="utf-8"?>
+<p:sld xmlns:a="http://schemas.openxmlformats.org/drawingml/2006/main" xmlns:r="http://schemas.openxmlformats.org/officeDocument/2006/relationships" xmlns:p="http://schemas.openxmlformats.org/presentationml/2006/main">
+  <p:cSld>
+    <p:spTree>
+      <p:nvGrpSpPr>
+        <p:cNvPr id="1" name=""/>
+        <p:cNvGrpSpPr/>
+        <p:nvPr/>
+      </p:nvGrpSpPr>
+      <p:grpSpPr>
+        <a:xfrm>
+          <a:off x="0" y="0"/>
+          <a:ext cx="0" cy="0"/>
+          <a:chOff x="0" y="0"/>
+          <a:chExt cx="0" cy="0"/>
+        </a:xfrm>
+      </p:grpSpPr>
+      <p:sp>
+        <p:nvSpPr>
+          <p:cNvPr id="2" name="Title 1"/>
+          <p:cNvSpPr>
+            <a:spLocks noGrp="1"/>
+          </p:cNvSpPr>
+          <p:nvPr>
+            <p:ph type="title"/>
+          </p:nvPr>
+        </p:nvSpPr>
+        <p:spPr/>
+        <p:txBody>
+          <a:bodyPr/>
+          <a:lstStyle/>
+          <a:p>
+            <a:r>
+              <a:rPr lang="en-US" dirty="0" smtClean="0"/>
+              <a:t>Use case diagram</a:t>
+            </a:r>
+            <a:endParaRPr lang="en-US" dirty="0"/>
+          </a:p>
+        </p:txBody>
+      </p:sp>
+      <p:pic>
+        <p:nvPicPr>
+          <p:cNvPr id="4" name="Picture 3"/>
+          <p:cNvPicPr/>
+          <p:nvPr/>
+        </p:nvPicPr>
+        <p:blipFill>
+          <a:blip r:embed="rId2"/>
+          <a:stretch>
+            <a:fillRect/>
+          </a:stretch>
+        </p:blipFill>
+        <p:spPr>
+          <a:xfrm>
+            <a:off x="3122612" y="2097088"/>
+            <a:ext cx="5943600" cy="4540250"/>
+          </a:xfrm>
+          <a:prstGeom prst="rect">
+            <a:avLst/>
+          </a:prstGeom>
+        </p:spPr>
+      </p:pic>
+    </p:spTree>
+    <p:extLst>
+      <p:ext uri="{BB962C8B-B14F-4D97-AF65-F5344CB8AC3E}">
+        <p14:creationId xmlns:p14="http://schemas.microsoft.com/office/powerpoint/2010/main" val="2084663991"/>
+      </p:ext>
+    </p:extLst>
+  </p:cSld>
+  <p:clrMapOvr>
+    <a:masterClrMapping/>
+  </p:clrMapOvr>
+</p:sld>
+</file>
+
 <file path=ppt/slides/slide2.xml><?xml version="1.0" encoding="utf-8"?>
 <p:sld xmlns:a="http://schemas.openxmlformats.org/drawingml/2006/main" xmlns:r="http://schemas.openxmlformats.org/officeDocument/2006/relationships" xmlns:p="http://schemas.openxmlformats.org/presentationml/2006/main">
   <p:cSld>
@@ -12679,6 +13214,469 @@
     <p:extLst>
       <p:ext uri="{BB962C8B-B14F-4D97-AF65-F5344CB8AC3E}">
         <p14:creationId xmlns:p14="http://schemas.microsoft.com/office/powerpoint/2010/main" val="356812744"/>
+      </p:ext>
+    </p:extLst>
+  </p:cSld>
+  <p:clrMapOvr>
+    <a:masterClrMapping/>
+  </p:clrMapOvr>
+</p:sld>
+</file>
+
+<file path=ppt/slides/slide5.xml><?xml version="1.0" encoding="utf-8"?>
+<p:sld xmlns:a="http://schemas.openxmlformats.org/drawingml/2006/main" xmlns:r="http://schemas.openxmlformats.org/officeDocument/2006/relationships" xmlns:p="http://schemas.openxmlformats.org/presentationml/2006/main">
+  <p:cSld>
+    <p:spTree>
+      <p:nvGrpSpPr>
+        <p:cNvPr id="1" name=""/>
+        <p:cNvGrpSpPr/>
+        <p:nvPr/>
+      </p:nvGrpSpPr>
+      <p:grpSpPr>
+        <a:xfrm>
+          <a:off x="0" y="0"/>
+          <a:ext cx="0" cy="0"/>
+          <a:chOff x="0" y="0"/>
+          <a:chExt cx="0" cy="0"/>
+        </a:xfrm>
+      </p:grpSpPr>
+      <p:sp>
+        <p:nvSpPr>
+          <p:cNvPr id="2" name="Title 1"/>
+          <p:cNvSpPr>
+            <a:spLocks noGrp="1"/>
+          </p:cNvSpPr>
+          <p:nvPr>
+            <p:ph type="title"/>
+          </p:nvPr>
+        </p:nvSpPr>
+        <p:spPr/>
+        <p:txBody>
+          <a:bodyPr/>
+          <a:lstStyle/>
+          <a:p>
+            <a:r>
+              <a:rPr lang="en-US" dirty="0" smtClean="0"/>
+              <a:t>Functional Requirements</a:t>
+            </a:r>
+            <a:endParaRPr lang="en-US" dirty="0"/>
+          </a:p>
+        </p:txBody>
+      </p:sp>
+      <p:sp>
+        <p:nvSpPr>
+          <p:cNvPr id="3" name="Content Placeholder 2"/>
+          <p:cNvSpPr>
+            <a:spLocks noGrp="1"/>
+          </p:cNvSpPr>
+          <p:nvPr>
+            <p:ph idx="1"/>
+          </p:nvPr>
+        </p:nvSpPr>
+        <p:spPr/>
+        <p:txBody>
+          <a:bodyPr>
+            <a:normAutofit fontScale="92500"/>
+          </a:bodyPr>
+          <a:lstStyle/>
+          <a:p>
+            <a:r>
+              <a:rPr lang="en-US" dirty="0"/>
+              <a:t>The player shall be able to move up, down, left, and right, unless stopped by a wall. </a:t>
+            </a:r>
+            <a:endParaRPr lang="en-US" dirty="0" smtClean="0"/>
+          </a:p>
+          <a:p>
+            <a:r>
+              <a:rPr lang="en-US" dirty="0"/>
+              <a:t>The software shall feature music and sound effects.</a:t>
+            </a:r>
+            <a:r>
+              <a:rPr lang="en-US" dirty="0"/>
+              <a:t> </a:t>
+            </a:r>
+            <a:endParaRPr lang="en-US" dirty="0" smtClean="0"/>
+          </a:p>
+          <a:p>
+            <a:r>
+              <a:rPr lang="en-US" dirty="0"/>
+              <a:t>The player shall be able to navigate into other areas and rooms in their environment.  These rooms shall load and open once the player has indicated their desire to enter. </a:t>
+            </a:r>
+            <a:endParaRPr lang="en-US" dirty="0" smtClean="0"/>
+          </a:p>
+          <a:p>
+            <a:r>
+              <a:rPr lang="en-US" dirty="0"/>
+              <a:t>The player and enemies shall have a set amount of health.  If this is depleted, the player/enemy shall die.  If the player dies the game shall end. </a:t>
+            </a:r>
+            <a:endParaRPr lang="en-US" dirty="0"/>
+          </a:p>
+        </p:txBody>
+      </p:sp>
+    </p:spTree>
+    <p:extLst>
+      <p:ext uri="{BB962C8B-B14F-4D97-AF65-F5344CB8AC3E}">
+        <p14:creationId xmlns:p14="http://schemas.microsoft.com/office/powerpoint/2010/main" val="1774643749"/>
+      </p:ext>
+    </p:extLst>
+  </p:cSld>
+  <p:clrMapOvr>
+    <a:masterClrMapping/>
+  </p:clrMapOvr>
+</p:sld>
+</file>
+
+<file path=ppt/slides/slide6.xml><?xml version="1.0" encoding="utf-8"?>
+<p:sld xmlns:a="http://schemas.openxmlformats.org/drawingml/2006/main" xmlns:r="http://schemas.openxmlformats.org/officeDocument/2006/relationships" xmlns:p="http://schemas.openxmlformats.org/presentationml/2006/main">
+  <p:cSld>
+    <p:spTree>
+      <p:nvGrpSpPr>
+        <p:cNvPr id="1" name=""/>
+        <p:cNvGrpSpPr/>
+        <p:nvPr/>
+      </p:nvGrpSpPr>
+      <p:grpSpPr>
+        <a:xfrm>
+          <a:off x="0" y="0"/>
+          <a:ext cx="0" cy="0"/>
+          <a:chOff x="0" y="0"/>
+          <a:chExt cx="0" cy="0"/>
+        </a:xfrm>
+      </p:grpSpPr>
+      <p:sp>
+        <p:nvSpPr>
+          <p:cNvPr id="2" name="Title 1"/>
+          <p:cNvSpPr>
+            <a:spLocks noGrp="1"/>
+          </p:cNvSpPr>
+          <p:nvPr>
+            <p:ph type="title"/>
+          </p:nvPr>
+        </p:nvSpPr>
+        <p:spPr/>
+        <p:txBody>
+          <a:bodyPr/>
+          <a:lstStyle/>
+          <a:p>
+            <a:r>
+              <a:rPr lang="en-US" dirty="0" smtClean="0"/>
+              <a:t>Interface requirements</a:t>
+            </a:r>
+            <a:endParaRPr lang="en-US" dirty="0"/>
+          </a:p>
+        </p:txBody>
+      </p:sp>
+      <p:sp>
+        <p:nvSpPr>
+          <p:cNvPr id="3" name="Content Placeholder 2"/>
+          <p:cNvSpPr>
+            <a:spLocks noGrp="1"/>
+          </p:cNvSpPr>
+          <p:nvPr>
+            <p:ph idx="1"/>
+          </p:nvPr>
+        </p:nvSpPr>
+        <p:spPr/>
+        <p:txBody>
+          <a:bodyPr/>
+          <a:lstStyle/>
+          <a:p>
+            <a:r>
+              <a:rPr lang="en-US" dirty="0"/>
+              <a:t>The user shall be able to start a new game. </a:t>
+            </a:r>
+            <a:endParaRPr lang="en-US" dirty="0" smtClean="0"/>
+          </a:p>
+          <a:p>
+            <a:r>
+              <a:rPr lang="en-US" dirty="0"/>
+              <a:t>The player shall be able to pause the current game to pull up a pause menu. </a:t>
+            </a:r>
+            <a:endParaRPr lang="en-US" dirty="0"/>
+          </a:p>
+        </p:txBody>
+      </p:sp>
+    </p:spTree>
+    <p:extLst>
+      <p:ext uri="{BB962C8B-B14F-4D97-AF65-F5344CB8AC3E}">
+        <p14:creationId xmlns:p14="http://schemas.microsoft.com/office/powerpoint/2010/main" val="565430924"/>
+      </p:ext>
+    </p:extLst>
+  </p:cSld>
+  <p:clrMapOvr>
+    <a:masterClrMapping/>
+  </p:clrMapOvr>
+</p:sld>
+</file>
+
+<file path=ppt/slides/slide7.xml><?xml version="1.0" encoding="utf-8"?>
+<p:sld xmlns:a="http://schemas.openxmlformats.org/drawingml/2006/main" xmlns:r="http://schemas.openxmlformats.org/officeDocument/2006/relationships" xmlns:p="http://schemas.openxmlformats.org/presentationml/2006/main">
+  <p:cSld>
+    <p:spTree>
+      <p:nvGrpSpPr>
+        <p:cNvPr id="1" name=""/>
+        <p:cNvGrpSpPr/>
+        <p:nvPr/>
+      </p:nvGrpSpPr>
+      <p:grpSpPr>
+        <a:xfrm>
+          <a:off x="0" y="0"/>
+          <a:ext cx="0" cy="0"/>
+          <a:chOff x="0" y="0"/>
+          <a:chExt cx="0" cy="0"/>
+        </a:xfrm>
+      </p:grpSpPr>
+      <p:sp>
+        <p:nvSpPr>
+          <p:cNvPr id="2" name="Title 1"/>
+          <p:cNvSpPr>
+            <a:spLocks noGrp="1"/>
+          </p:cNvSpPr>
+          <p:nvPr>
+            <p:ph type="title"/>
+          </p:nvPr>
+        </p:nvSpPr>
+        <p:spPr/>
+        <p:txBody>
+          <a:bodyPr/>
+          <a:lstStyle/>
+          <a:p>
+            <a:r>
+              <a:rPr lang="en-US" dirty="0" smtClean="0"/>
+              <a:t>Physical environment requirements</a:t>
+            </a:r>
+            <a:endParaRPr lang="en-US" dirty="0"/>
+          </a:p>
+        </p:txBody>
+      </p:sp>
+      <p:sp>
+        <p:nvSpPr>
+          <p:cNvPr id="3" name="Content Placeholder 2"/>
+          <p:cNvSpPr>
+            <a:spLocks noGrp="1"/>
+          </p:cNvSpPr>
+          <p:nvPr>
+            <p:ph idx="1"/>
+          </p:nvPr>
+        </p:nvSpPr>
+        <p:spPr/>
+        <p:txBody>
+          <a:bodyPr/>
+          <a:lstStyle/>
+          <a:p>
+            <a:r>
+              <a:rPr lang="en-US" dirty="0"/>
+              <a:t>The application shall run on a PC using the latest version of either Windows, OSX, or Linux</a:t>
+            </a:r>
+            <a:r>
+              <a:rPr lang="en-US" dirty="0"/>
+              <a:t> </a:t>
+            </a:r>
+            <a:endParaRPr lang="en-US" dirty="0" smtClean="0"/>
+          </a:p>
+          <a:p>
+            <a:r>
+              <a:rPr lang="en-US" dirty="0"/>
+              <a:t>The application should support keyboard and mouse input</a:t>
+            </a:r>
+            <a:r>
+              <a:rPr lang="en-US" dirty="0"/>
+              <a:t> </a:t>
+            </a:r>
+            <a:endParaRPr lang="en-US" dirty="0" smtClean="0"/>
+          </a:p>
+          <a:p>
+            <a:endParaRPr lang="en-US" dirty="0"/>
+          </a:p>
+        </p:txBody>
+      </p:sp>
+    </p:spTree>
+    <p:extLst>
+      <p:ext uri="{BB962C8B-B14F-4D97-AF65-F5344CB8AC3E}">
+        <p14:creationId xmlns:p14="http://schemas.microsoft.com/office/powerpoint/2010/main" val="158403931"/>
+      </p:ext>
+    </p:extLst>
+  </p:cSld>
+  <p:clrMapOvr>
+    <a:masterClrMapping/>
+  </p:clrMapOvr>
+</p:sld>
+</file>
+
+<file path=ppt/slides/slide8.xml><?xml version="1.0" encoding="utf-8"?>
+<p:sld xmlns:a="http://schemas.openxmlformats.org/drawingml/2006/main" xmlns:r="http://schemas.openxmlformats.org/officeDocument/2006/relationships" xmlns:p="http://schemas.openxmlformats.org/presentationml/2006/main">
+  <p:cSld>
+    <p:spTree>
+      <p:nvGrpSpPr>
+        <p:cNvPr id="1" name=""/>
+        <p:cNvGrpSpPr/>
+        <p:nvPr/>
+      </p:nvGrpSpPr>
+      <p:grpSpPr>
+        <a:xfrm>
+          <a:off x="0" y="0"/>
+          <a:ext cx="0" cy="0"/>
+          <a:chOff x="0" y="0"/>
+          <a:chExt cx="0" cy="0"/>
+        </a:xfrm>
+      </p:grpSpPr>
+      <p:sp>
+        <p:nvSpPr>
+          <p:cNvPr id="2" name="Title 1"/>
+          <p:cNvSpPr>
+            <a:spLocks noGrp="1"/>
+          </p:cNvSpPr>
+          <p:nvPr>
+            <p:ph type="title"/>
+          </p:nvPr>
+        </p:nvSpPr>
+        <p:spPr/>
+        <p:txBody>
+          <a:bodyPr/>
+          <a:lstStyle/>
+          <a:p>
+            <a:r>
+              <a:rPr lang="en-US" dirty="0" smtClean="0"/>
+              <a:t>User and human factors requirements</a:t>
+            </a:r>
+            <a:endParaRPr lang="en-US" dirty="0"/>
+          </a:p>
+        </p:txBody>
+      </p:sp>
+      <p:sp>
+        <p:nvSpPr>
+          <p:cNvPr id="3" name="Content Placeholder 2"/>
+          <p:cNvSpPr>
+            <a:spLocks noGrp="1"/>
+          </p:cNvSpPr>
+          <p:nvPr>
+            <p:ph idx="1"/>
+          </p:nvPr>
+        </p:nvSpPr>
+        <p:spPr/>
+        <p:txBody>
+          <a:bodyPr/>
+          <a:lstStyle/>
+          <a:p>
+            <a:r>
+              <a:rPr lang="en-US" dirty="0"/>
+              <a:t>The game shall support users of all skill levels and of all ages. </a:t>
+            </a:r>
+            <a:endParaRPr lang="en-US" dirty="0" smtClean="0"/>
+          </a:p>
+          <a:p>
+            <a:r>
+              <a:rPr lang="en-US" dirty="0"/>
+              <a:t>The game shall accommodate all players by having an ability to increase or decrease audio and font size. </a:t>
+            </a:r>
+            <a:endParaRPr lang="en-US" dirty="0" smtClean="0"/>
+          </a:p>
+          <a:p>
+            <a:r>
+              <a:rPr lang="en-US" dirty="0"/>
+              <a:t>The software should be bug free.  The game should not let users exploit bugs to cheat and achieve a higher score. </a:t>
+            </a:r>
+            <a:endParaRPr lang="en-US" dirty="0" smtClean="0"/>
+          </a:p>
+          <a:p>
+            <a:endParaRPr lang="en-US" dirty="0"/>
+          </a:p>
+        </p:txBody>
+      </p:sp>
+    </p:spTree>
+    <p:extLst>
+      <p:ext uri="{BB962C8B-B14F-4D97-AF65-F5344CB8AC3E}">
+        <p14:creationId xmlns:p14="http://schemas.microsoft.com/office/powerpoint/2010/main" val="1510197141"/>
+      </p:ext>
+    </p:extLst>
+  </p:cSld>
+  <p:clrMapOvr>
+    <a:masterClrMapping/>
+  </p:clrMapOvr>
+</p:sld>
+</file>
+
+<file path=ppt/slides/slide9.xml><?xml version="1.0" encoding="utf-8"?>
+<p:sld xmlns:a="http://schemas.openxmlformats.org/drawingml/2006/main" xmlns:r="http://schemas.openxmlformats.org/officeDocument/2006/relationships" xmlns:p="http://schemas.openxmlformats.org/presentationml/2006/main">
+  <p:cSld>
+    <p:spTree>
+      <p:nvGrpSpPr>
+        <p:cNvPr id="1" name=""/>
+        <p:cNvGrpSpPr/>
+        <p:nvPr/>
+      </p:nvGrpSpPr>
+      <p:grpSpPr>
+        <a:xfrm>
+          <a:off x="0" y="0"/>
+          <a:ext cx="0" cy="0"/>
+          <a:chOff x="0" y="0"/>
+          <a:chExt cx="0" cy="0"/>
+        </a:xfrm>
+      </p:grpSpPr>
+      <p:sp>
+        <p:nvSpPr>
+          <p:cNvPr id="2" name="Title 1"/>
+          <p:cNvSpPr>
+            <a:spLocks noGrp="1"/>
+          </p:cNvSpPr>
+          <p:nvPr>
+            <p:ph type="title"/>
+          </p:nvPr>
+        </p:nvSpPr>
+        <p:spPr/>
+        <p:txBody>
+          <a:bodyPr/>
+          <a:lstStyle/>
+          <a:p>
+            <a:r>
+              <a:rPr lang="en-US" dirty="0" smtClean="0"/>
+              <a:t>Documentation requirements</a:t>
+            </a:r>
+            <a:endParaRPr lang="en-US" dirty="0"/>
+          </a:p>
+        </p:txBody>
+      </p:sp>
+      <p:sp>
+        <p:nvSpPr>
+          <p:cNvPr id="3" name="Content Placeholder 2"/>
+          <p:cNvSpPr>
+            <a:spLocks noGrp="1"/>
+          </p:cNvSpPr>
+          <p:nvPr>
+            <p:ph idx="1"/>
+          </p:nvPr>
+        </p:nvSpPr>
+        <p:spPr/>
+        <p:txBody>
+          <a:bodyPr/>
+          <a:lstStyle/>
+          <a:p>
+            <a:r>
+              <a:rPr lang="en-US" dirty="0"/>
+              <a:t>The player shall be able view a manual consisting of game features and mechanics. </a:t>
+            </a:r>
+            <a:endParaRPr lang="en-US" dirty="0" smtClean="0"/>
+          </a:p>
+          <a:p>
+            <a:r>
+              <a:rPr lang="en-US" dirty="0"/>
+              <a:t>All game documentation shall be put online for the users to explore all aspects of the game and its design and implementation. </a:t>
+            </a:r>
+            <a:r>
+              <a:rPr lang="en-US" dirty="0" smtClean="0"/>
+              <a:t/>
+            </a:r>
+            <a:br>
+              <a:rPr lang="en-US" dirty="0" smtClean="0"/>
+            </a:br>
+            <a:endParaRPr lang="en-US" dirty="0"/>
+          </a:p>
+        </p:txBody>
+      </p:sp>
+    </p:spTree>
+    <p:extLst>
+      <p:ext uri="{BB962C8B-B14F-4D97-AF65-F5344CB8AC3E}">
+        <p14:creationId xmlns:p14="http://schemas.microsoft.com/office/powerpoint/2010/main" val="244959058"/>
       </p:ext>
     </p:extLst>
   </p:cSld>

</xml_diff>